<commit_message>
Added the source of the image in the presentation
</commit_message>
<xml_diff>
--- a/phase4/301 Final Presentation Slides.pptx
+++ b/phase4/301 Final Presentation Slides.pptx
@@ -496,7 +496,7 @@
   <p:cSld>
     <p:spTree>
       <p:nvGrpSpPr>
-        <p:cNvPr id="89" name="Shape 89"/>
+        <p:cNvPr id="90" name="Shape 90"/>
         <p:cNvGrpSpPr/>
         <p:nvPr/>
       </p:nvGrpSpPr>
@@ -510,7 +510,7 @@
       </p:grpSpPr>
       <p:sp>
         <p:nvSpPr>
-          <p:cNvPr id="90" name="Shape 90"/>
+          <p:cNvPr id="91" name="Shape 91"/>
           <p:cNvSpPr/>
           <p:nvPr>
             <p:ph idx="2" type="sldImg"/>
@@ -554,7 +554,7 @@
       </p:sp>
       <p:sp>
         <p:nvSpPr>
-          <p:cNvPr id="91" name="Shape 91"/>
+          <p:cNvPr id="92" name="Shape 92"/>
           <p:cNvSpPr txBox="1"/>
           <p:nvPr>
             <p:ph idx="1" type="body"/>
@@ -601,7 +601,7 @@
   <p:cSld>
     <p:spTree>
       <p:nvGrpSpPr>
-        <p:cNvPr id="95" name="Shape 95"/>
+        <p:cNvPr id="96" name="Shape 96"/>
         <p:cNvGrpSpPr/>
         <p:nvPr/>
       </p:nvGrpSpPr>
@@ -615,7 +615,7 @@
       </p:grpSpPr>
       <p:sp>
         <p:nvSpPr>
-          <p:cNvPr id="96" name="Shape 96"/>
+          <p:cNvPr id="97" name="Shape 97"/>
           <p:cNvSpPr/>
           <p:nvPr>
             <p:ph idx="2" type="sldImg"/>
@@ -659,7 +659,7 @@
       </p:sp>
       <p:sp>
         <p:nvSpPr>
-          <p:cNvPr id="97" name="Shape 97"/>
+          <p:cNvPr id="98" name="Shape 98"/>
           <p:cNvSpPr txBox="1"/>
           <p:nvPr>
             <p:ph idx="1" type="body"/>
@@ -710,7 +710,7 @@
   <p:cSld>
     <p:spTree>
       <p:nvGrpSpPr>
-        <p:cNvPr id="101" name="Shape 101"/>
+        <p:cNvPr id="102" name="Shape 102"/>
         <p:cNvGrpSpPr/>
         <p:nvPr/>
       </p:nvGrpSpPr>
@@ -724,7 +724,7 @@
       </p:grpSpPr>
       <p:sp>
         <p:nvSpPr>
-          <p:cNvPr id="102" name="Shape 102"/>
+          <p:cNvPr id="103" name="Shape 103"/>
           <p:cNvSpPr/>
           <p:nvPr>
             <p:ph idx="2" type="sldImg"/>
@@ -768,7 +768,7 @@
       </p:sp>
       <p:sp>
         <p:nvSpPr>
-          <p:cNvPr id="103" name="Shape 103"/>
+          <p:cNvPr id="104" name="Shape 104"/>
           <p:cNvSpPr txBox="1"/>
           <p:nvPr>
             <p:ph idx="1" type="body"/>
@@ -3779,6 +3779,48 @@
           </a:ln>
         </p:spPr>
       </p:pic>
+      <p:sp>
+        <p:nvSpPr>
+          <p:cNvPr id="89" name="Shape 89"/>
+          <p:cNvSpPr txBox="1"/>
+          <p:nvPr/>
+        </p:nvSpPr>
+        <p:spPr>
+          <a:xfrm>
+            <a:off y="4561050" x="5979000"/>
+            <a:ext cy="331500" cx="2605499"/>
+          </a:xfrm>
+          <a:prstGeom prst="rect">
+            <a:avLst/>
+          </a:prstGeom>
+          <a:noFill/>
+          <a:ln>
+            <a:noFill/>
+          </a:ln>
+        </p:spPr>
+        <p:txBody>
+          <a:bodyPr bIns="91425" rIns="91425" lIns="91425" tIns="91425" anchor="t" anchorCtr="0">
+            <a:noAutofit/>
+          </a:bodyPr>
+          <a:lstStyle/>
+          <a:p>
+            <a:pPr>
+              <a:spcBef>
+                <a:spcPts val="0"/>
+              </a:spcBef>
+              <a:buNone/>
+            </a:pPr>
+            <a:r>
+              <a:rPr sz="800" lang="en">
+                <a:solidFill>
+                  <a:srgbClr val="CCCCCC"/>
+                </a:solidFill>
+              </a:rPr>
+              <a:t>(http://littlegreenriver.com/weblog/wp-content/uploads/mtv-diagram-730x1024.png)</a:t>
+            </a:r>
+          </a:p>
+        </p:txBody>
+      </p:sp>
     </p:spTree>
   </p:cSld>
   <p:clrMapOvr>
@@ -3795,7 +3837,7 @@
   <p:cSld>
     <p:spTree>
       <p:nvGrpSpPr>
-        <p:cNvPr id="92" name="Shape 92"/>
+        <p:cNvPr id="93" name="Shape 93"/>
         <p:cNvGrpSpPr/>
         <p:nvPr/>
       </p:nvGrpSpPr>
@@ -3809,7 +3851,7 @@
       </p:grpSpPr>
       <p:sp>
         <p:nvSpPr>
-          <p:cNvPr id="93" name="Shape 93"/>
+          <p:cNvPr id="94" name="Shape 94"/>
           <p:cNvSpPr txBox="1"/>
           <p:nvPr>
             <p:ph type="title"/>
@@ -3845,7 +3887,7 @@
       </p:sp>
       <p:sp>
         <p:nvSpPr>
-          <p:cNvPr id="94" name="Shape 94"/>
+          <p:cNvPr id="95" name="Shape 95"/>
           <p:cNvSpPr txBox="1"/>
           <p:nvPr>
             <p:ph idx="1" type="body"/>
@@ -4039,7 +4081,7 @@
   <p:cSld>
     <p:spTree>
       <p:nvGrpSpPr>
-        <p:cNvPr id="98" name="Shape 98"/>
+        <p:cNvPr id="99" name="Shape 99"/>
         <p:cNvGrpSpPr/>
         <p:nvPr/>
       </p:nvGrpSpPr>
@@ -4053,7 +4095,7 @@
       </p:grpSpPr>
       <p:sp>
         <p:nvSpPr>
-          <p:cNvPr id="99" name="Shape 99"/>
+          <p:cNvPr id="100" name="Shape 100"/>
           <p:cNvSpPr txBox="1"/>
           <p:nvPr>
             <p:ph type="title"/>
@@ -4089,7 +4131,7 @@
       </p:sp>
       <p:sp>
         <p:nvSpPr>
-          <p:cNvPr id="100" name="Shape 100"/>
+          <p:cNvPr id="101" name="Shape 101"/>
           <p:cNvSpPr txBox="1"/>
           <p:nvPr>
             <p:ph idx="1" type="body"/>
@@ -5551,283 +5593,6 @@
 </file>
 
 <file path=ppt/theme/theme1.xml><?xml version="1.0" encoding="utf-8"?>
-<a:theme xmlns:a="http://schemas.openxmlformats.org/drawingml/2006/main" xmlns:r="http://schemas.openxmlformats.org/officeDocument/2006/relationships" name="dark-gradient">
-  <a:themeElements>
-    <a:clrScheme name="Custom 346">
-      <a:dk1>
-        <a:srgbClr val="000000"/>
-      </a:dk1>
-      <a:lt1>
-        <a:srgbClr val="FFFFFF"/>
-      </a:lt1>
-      <a:dk2>
-        <a:srgbClr val="4C4C4C"/>
-      </a:dk2>
-      <a:lt2>
-        <a:srgbClr val="CCCCCC"/>
-      </a:lt2>
-      <a:accent1>
-        <a:srgbClr val="89B4B8"/>
-      </a:accent1>
-      <a:accent2>
-        <a:srgbClr val="AFA6CA"/>
-      </a:accent2>
-      <a:accent3>
-        <a:srgbClr val="A5B492"/>
-      </a:accent3>
-      <a:accent4>
-        <a:srgbClr val="E8CD6D"/>
-      </a:accent4>
-      <a:accent5>
-        <a:srgbClr val="F4A447"/>
-      </a:accent5>
-      <a:accent6>
-        <a:srgbClr val="D09D94"/>
-      </a:accent6>
-      <a:hlink>
-        <a:srgbClr val="5EA7AA"/>
-      </a:hlink>
-      <a:folHlink>
-        <a:srgbClr val="A295BE"/>
-      </a:folHlink>
-    </a:clrScheme>
-    <a:fontScheme name="Office">
-      <a:majorFont>
-        <a:latin typeface="Arial"/>
-        <a:ea typeface=""/>
-        <a:cs typeface=""/>
-        <a:font typeface="ＭＳ Ｐゴシック" script="Jpan"/>
-        <a:font typeface="맑은 고딕" script="Hang"/>
-        <a:font typeface="宋体" script="Hans"/>
-        <a:font typeface="新細明體" script="Hant"/>
-        <a:font typeface="Times New Roman" script="Arab"/>
-        <a:font typeface="Times New Roman" script="Hebr"/>
-        <a:font typeface="Angsana New" script="Thai"/>
-        <a:font typeface="Nyala" script="Ethi"/>
-        <a:font typeface="Vrinda" script="Beng"/>
-        <a:font typeface="Shruti" script="Gujr"/>
-        <a:font typeface="MoolBoran" script="Khmr"/>
-        <a:font typeface="Tunga" script="Knda"/>
-        <a:font typeface="Raavi" script="Guru"/>
-        <a:font typeface="Euphemia" script="Cans"/>
-        <a:font typeface="Plantagenet Cherokee" script="Cher"/>
-        <a:font typeface="Microsoft Yi Baiti" script="Yiii"/>
-        <a:font typeface="Microsoft Himalaya" script="Tibt"/>
-        <a:font typeface="MV Boli" script="Thaa"/>
-        <a:font typeface="Mangal" script="Deva"/>
-        <a:font typeface="Gautami" script="Telu"/>
-        <a:font typeface="Latha" script="Taml"/>
-        <a:font typeface="Estrangelo Edessa" script="Syrc"/>
-        <a:font typeface="Kalinga" script="Orya"/>
-        <a:font typeface="Kartika" script="Mlym"/>
-        <a:font typeface="DokChampa" script="Laoo"/>
-        <a:font typeface="Iskoola Pota" script="Sinh"/>
-        <a:font typeface="Mongolian Baiti" script="Mong"/>
-        <a:font typeface="Times New Roman" script="Viet"/>
-        <a:font typeface="Microsoft Uighur" script="Uigh"/>
-      </a:majorFont>
-      <a:minorFont>
-        <a:latin typeface="Arial"/>
-        <a:ea typeface=""/>
-        <a:cs typeface=""/>
-        <a:font typeface="ＭＳ Ｐゴシック" script="Jpan"/>
-        <a:font typeface="맑은 고딕" script="Hang"/>
-        <a:font typeface="宋体" script="Hans"/>
-        <a:font typeface="新細明體" script="Hant"/>
-        <a:font typeface="Times New Roman" script="Arab"/>
-        <a:font typeface="Times New Roman" script="Hebr"/>
-        <a:font typeface="Angsana New" script="Thai"/>
-        <a:font typeface="Nyala" script="Ethi"/>
-        <a:font typeface="Vrinda" script="Beng"/>
-        <a:font typeface="Shruti" script="Gujr"/>
-        <a:font typeface="MoolBoran" script="Khmr"/>
-        <a:font typeface="Tunga" script="Knda"/>
-        <a:font typeface="Raavi" script="Guru"/>
-        <a:font typeface="Euphemia" script="Cans"/>
-        <a:font typeface="Plantagenet Cherokee" script="Cher"/>
-        <a:font typeface="Microsoft Yi Baiti" script="Yiii"/>
-        <a:font typeface="Microsoft Himalaya" script="Tibt"/>
-        <a:font typeface="MV Boli" script="Thaa"/>
-        <a:font typeface="Mangal" script="Deva"/>
-        <a:font typeface="Gautami" script="Telu"/>
-        <a:font typeface="Latha" script="Taml"/>
-        <a:font typeface="Estrangelo Edessa" script="Syrc"/>
-        <a:font typeface="Kalinga" script="Orya"/>
-        <a:font typeface="Kartika" script="Mlym"/>
-        <a:font typeface="DokChampa" script="Laoo"/>
-        <a:font typeface="Iskoola Pota" script="Sinh"/>
-        <a:font typeface="Mongolian Baiti" script="Mong"/>
-        <a:font typeface="Times New Roman" script="Viet"/>
-        <a:font typeface="Microsoft Uighur" script="Uigh"/>
-      </a:minorFont>
-    </a:fontScheme>
-    <a:fmtScheme name="Office">
-      <a:fillStyleLst>
-        <a:solidFill>
-          <a:schemeClr val="phClr"/>
-        </a:solidFill>
-        <a:gradFill rotWithShape="1">
-          <a:gsLst>
-            <a:gs pos="0">
-              <a:schemeClr val="phClr">
-                <a:tint val="50000"/>
-                <a:satMod val="300000"/>
-              </a:schemeClr>
-            </a:gs>
-            <a:gs pos="35000">
-              <a:schemeClr val="phClr">
-                <a:tint val="37000"/>
-                <a:satMod val="300000"/>
-              </a:schemeClr>
-            </a:gs>
-            <a:gs pos="100000">
-              <a:schemeClr val="phClr">
-                <a:tint val="15000"/>
-                <a:satMod val="350000"/>
-              </a:schemeClr>
-            </a:gs>
-          </a:gsLst>
-          <a:lin ang="16200000" scaled="1"/>
-        </a:gradFill>
-        <a:gradFill rotWithShape="1">
-          <a:gsLst>
-            <a:gs pos="0">
-              <a:schemeClr val="phClr">
-                <a:tint val="100000"/>
-                <a:shade val="100000"/>
-                <a:satMod val="130000"/>
-              </a:schemeClr>
-            </a:gs>
-            <a:gs pos="100000">
-              <a:schemeClr val="phClr">
-                <a:tint val="50000"/>
-                <a:shade val="100000"/>
-                <a:satMod val="350000"/>
-              </a:schemeClr>
-            </a:gs>
-          </a:gsLst>
-          <a:lin ang="16200000" scaled="0"/>
-        </a:gradFill>
-      </a:fillStyleLst>
-      <a:lnStyleLst>
-        <a:ln w="9525" algn="ctr" cap="flat" cmpd="sng">
-          <a:solidFill>
-            <a:schemeClr val="phClr">
-              <a:shade val="95000"/>
-              <a:satMod val="105000"/>
-            </a:schemeClr>
-          </a:solidFill>
-          <a:prstDash val="solid"/>
-        </a:ln>
-        <a:ln w="25400" algn="ctr" cap="flat" cmpd="sng">
-          <a:solidFill>
-            <a:schemeClr val="phClr"/>
-          </a:solidFill>
-          <a:prstDash val="solid"/>
-        </a:ln>
-        <a:ln w="38100" algn="ctr" cap="flat" cmpd="sng">
-          <a:solidFill>
-            <a:schemeClr val="phClr"/>
-          </a:solidFill>
-          <a:prstDash val="solid"/>
-        </a:ln>
-      </a:lnStyleLst>
-      <a:effectStyleLst>
-        <a:effectStyle>
-          <a:effectLst>
-            <a:outerShdw rotWithShape="0" dir="5400000" blurRad="40000" dist="20000">
-              <a:srgbClr val="000000">
-                <a:alpha val="38000"/>
-              </a:srgbClr>
-            </a:outerShdw>
-          </a:effectLst>
-        </a:effectStyle>
-        <a:effectStyle>
-          <a:effectLst>
-            <a:outerShdw rotWithShape="0" dir="5400000" blurRad="40000" dist="23000">
-              <a:srgbClr val="000000">
-                <a:alpha val="35000"/>
-              </a:srgbClr>
-            </a:outerShdw>
-          </a:effectLst>
-        </a:effectStyle>
-        <a:effectStyle>
-          <a:effectLst>
-            <a:outerShdw rotWithShape="0" dir="5400000" blurRad="40000" dist="23000">
-              <a:srgbClr val="000000">
-                <a:alpha val="35000"/>
-              </a:srgbClr>
-            </a:outerShdw>
-          </a:effectLst>
-          <a:scene3d>
-            <a:camera prst="orthographicFront">
-              <a:rot rev="0" lon="0" lat="0"/>
-            </a:camera>
-            <a:lightRig dir="t" rig="threePt">
-              <a:rot rev="1200000" lon="0" lat="0"/>
-            </a:lightRig>
-          </a:scene3d>
-          <a:sp3d>
-            <a:bevelT w="63500" h="25400"/>
-          </a:sp3d>
-        </a:effectStyle>
-      </a:effectStyleLst>
-      <a:bgFillStyleLst>
-        <a:solidFill>
-          <a:schemeClr val="phClr"/>
-        </a:solidFill>
-        <a:gradFill rotWithShape="1">
-          <a:gsLst>
-            <a:gs pos="0">
-              <a:schemeClr val="phClr">
-                <a:tint val="40000"/>
-                <a:satMod val="350000"/>
-              </a:schemeClr>
-            </a:gs>
-            <a:gs pos="40000">
-              <a:schemeClr val="phClr">
-                <a:tint val="45000"/>
-                <a:shade val="99000"/>
-                <a:satMod val="350000"/>
-              </a:schemeClr>
-            </a:gs>
-            <a:gs pos="100000">
-              <a:schemeClr val="phClr">
-                <a:shade val="20000"/>
-                <a:satMod val="255000"/>
-              </a:schemeClr>
-            </a:gs>
-          </a:gsLst>
-          <a:path path="circle">
-            <a:fillToRect t="-80000" b="180000" r="50000" l="50000"/>
-          </a:path>
-        </a:gradFill>
-        <a:gradFill rotWithShape="1">
-          <a:gsLst>
-            <a:gs pos="0">
-              <a:schemeClr val="phClr">
-                <a:tint val="80000"/>
-                <a:satMod val="300000"/>
-              </a:schemeClr>
-            </a:gs>
-            <a:gs pos="100000">
-              <a:schemeClr val="phClr">
-                <a:shade val="30000"/>
-                <a:satMod val="200000"/>
-              </a:schemeClr>
-            </a:gs>
-          </a:gsLst>
-          <a:path path="circle">
-            <a:fillToRect t="50000" b="50000" r="50000" l="50000"/>
-          </a:path>
-        </a:gradFill>
-      </a:bgFillStyleLst>
-    </a:fmtScheme>
-  </a:themeElements>
-</a:theme>
-</file>
-
-<file path=ppt/theme/theme2.xml><?xml version="1.0" encoding="utf-8"?>
 <a:theme xmlns:a="http://schemas.openxmlformats.org/drawingml/2006/main" xmlns:r="http://schemas.openxmlformats.org/officeDocument/2006/relationships" name="Office Theme">
   <a:themeElements>
     <a:clrScheme name="Office">
@@ -6144,7 +5909,7 @@
 </a:theme>
 </file>
 
-<file path=ppt/theme/theme3.xml><?xml version="1.0" encoding="utf-8"?>
+<file path=ppt/theme/theme2.xml><?xml version="1.0" encoding="utf-8"?>
 <a:theme xmlns:a="http://schemas.openxmlformats.org/drawingml/2006/main" xmlns:r="http://schemas.openxmlformats.org/officeDocument/2006/relationships" name="Custom Theme">
   <a:themeElements>
     <a:clrScheme name="Default">
@@ -6419,4 +6184,281 @@
     </a:fmtScheme>
   </a:themeElements>
 </a:theme>
+</file>
+
+<file path=ppt/theme/theme3.xml><?xml version="1.0" encoding="utf-8"?>
+<a:theme xmlns:a="http://schemas.openxmlformats.org/drawingml/2006/main" xmlns:r="http://schemas.openxmlformats.org/officeDocument/2006/relationships" name="dark-gradient">
+  <a:themeElements>
+    <a:clrScheme name="Custom 346">
+      <a:dk1>
+        <a:srgbClr val="000000"/>
+      </a:dk1>
+      <a:lt1>
+        <a:srgbClr val="FFFFFF"/>
+      </a:lt1>
+      <a:dk2>
+        <a:srgbClr val="4C4C4C"/>
+      </a:dk2>
+      <a:lt2>
+        <a:srgbClr val="CCCCCC"/>
+      </a:lt2>
+      <a:accent1>
+        <a:srgbClr val="89B4B8"/>
+      </a:accent1>
+      <a:accent2>
+        <a:srgbClr val="AFA6CA"/>
+      </a:accent2>
+      <a:accent3>
+        <a:srgbClr val="A5B492"/>
+      </a:accent3>
+      <a:accent4>
+        <a:srgbClr val="E8CD6D"/>
+      </a:accent4>
+      <a:accent5>
+        <a:srgbClr val="F4A447"/>
+      </a:accent5>
+      <a:accent6>
+        <a:srgbClr val="D09D94"/>
+      </a:accent6>
+      <a:hlink>
+        <a:srgbClr val="5EA7AA"/>
+      </a:hlink>
+      <a:folHlink>
+        <a:srgbClr val="A295BE"/>
+      </a:folHlink>
+    </a:clrScheme>
+    <a:fontScheme name="Office">
+      <a:majorFont>
+        <a:latin typeface="Arial"/>
+        <a:ea typeface=""/>
+        <a:cs typeface=""/>
+        <a:font typeface="ＭＳ Ｐゴシック" script="Jpan"/>
+        <a:font typeface="맑은 고딕" script="Hang"/>
+        <a:font typeface="宋体" script="Hans"/>
+        <a:font typeface="新細明體" script="Hant"/>
+        <a:font typeface="Times New Roman" script="Arab"/>
+        <a:font typeface="Times New Roman" script="Hebr"/>
+        <a:font typeface="Angsana New" script="Thai"/>
+        <a:font typeface="Nyala" script="Ethi"/>
+        <a:font typeface="Vrinda" script="Beng"/>
+        <a:font typeface="Shruti" script="Gujr"/>
+        <a:font typeface="MoolBoran" script="Khmr"/>
+        <a:font typeface="Tunga" script="Knda"/>
+        <a:font typeface="Raavi" script="Guru"/>
+        <a:font typeface="Euphemia" script="Cans"/>
+        <a:font typeface="Plantagenet Cherokee" script="Cher"/>
+        <a:font typeface="Microsoft Yi Baiti" script="Yiii"/>
+        <a:font typeface="Microsoft Himalaya" script="Tibt"/>
+        <a:font typeface="MV Boli" script="Thaa"/>
+        <a:font typeface="Mangal" script="Deva"/>
+        <a:font typeface="Gautami" script="Telu"/>
+        <a:font typeface="Latha" script="Taml"/>
+        <a:font typeface="Estrangelo Edessa" script="Syrc"/>
+        <a:font typeface="Kalinga" script="Orya"/>
+        <a:font typeface="Kartika" script="Mlym"/>
+        <a:font typeface="DokChampa" script="Laoo"/>
+        <a:font typeface="Iskoola Pota" script="Sinh"/>
+        <a:font typeface="Mongolian Baiti" script="Mong"/>
+        <a:font typeface="Times New Roman" script="Viet"/>
+        <a:font typeface="Microsoft Uighur" script="Uigh"/>
+      </a:majorFont>
+      <a:minorFont>
+        <a:latin typeface="Arial"/>
+        <a:ea typeface=""/>
+        <a:cs typeface=""/>
+        <a:font typeface="ＭＳ Ｐゴシック" script="Jpan"/>
+        <a:font typeface="맑은 고딕" script="Hang"/>
+        <a:font typeface="宋体" script="Hans"/>
+        <a:font typeface="新細明體" script="Hant"/>
+        <a:font typeface="Times New Roman" script="Arab"/>
+        <a:font typeface="Times New Roman" script="Hebr"/>
+        <a:font typeface="Angsana New" script="Thai"/>
+        <a:font typeface="Nyala" script="Ethi"/>
+        <a:font typeface="Vrinda" script="Beng"/>
+        <a:font typeface="Shruti" script="Gujr"/>
+        <a:font typeface="MoolBoran" script="Khmr"/>
+        <a:font typeface="Tunga" script="Knda"/>
+        <a:font typeface="Raavi" script="Guru"/>
+        <a:font typeface="Euphemia" script="Cans"/>
+        <a:font typeface="Plantagenet Cherokee" script="Cher"/>
+        <a:font typeface="Microsoft Yi Baiti" script="Yiii"/>
+        <a:font typeface="Microsoft Himalaya" script="Tibt"/>
+        <a:font typeface="MV Boli" script="Thaa"/>
+        <a:font typeface="Mangal" script="Deva"/>
+        <a:font typeface="Gautami" script="Telu"/>
+        <a:font typeface="Latha" script="Taml"/>
+        <a:font typeface="Estrangelo Edessa" script="Syrc"/>
+        <a:font typeface="Kalinga" script="Orya"/>
+        <a:font typeface="Kartika" script="Mlym"/>
+        <a:font typeface="DokChampa" script="Laoo"/>
+        <a:font typeface="Iskoola Pota" script="Sinh"/>
+        <a:font typeface="Mongolian Baiti" script="Mong"/>
+        <a:font typeface="Times New Roman" script="Viet"/>
+        <a:font typeface="Microsoft Uighur" script="Uigh"/>
+      </a:minorFont>
+    </a:fontScheme>
+    <a:fmtScheme name="Office">
+      <a:fillStyleLst>
+        <a:solidFill>
+          <a:schemeClr val="phClr"/>
+        </a:solidFill>
+        <a:gradFill rotWithShape="1">
+          <a:gsLst>
+            <a:gs pos="0">
+              <a:schemeClr val="phClr">
+                <a:tint val="50000"/>
+                <a:satMod val="300000"/>
+              </a:schemeClr>
+            </a:gs>
+            <a:gs pos="35000">
+              <a:schemeClr val="phClr">
+                <a:tint val="37000"/>
+                <a:satMod val="300000"/>
+              </a:schemeClr>
+            </a:gs>
+            <a:gs pos="100000">
+              <a:schemeClr val="phClr">
+                <a:tint val="15000"/>
+                <a:satMod val="350000"/>
+              </a:schemeClr>
+            </a:gs>
+          </a:gsLst>
+          <a:lin ang="16200000" scaled="1"/>
+        </a:gradFill>
+        <a:gradFill rotWithShape="1">
+          <a:gsLst>
+            <a:gs pos="0">
+              <a:schemeClr val="phClr">
+                <a:tint val="100000"/>
+                <a:shade val="100000"/>
+                <a:satMod val="130000"/>
+              </a:schemeClr>
+            </a:gs>
+            <a:gs pos="100000">
+              <a:schemeClr val="phClr">
+                <a:tint val="50000"/>
+                <a:shade val="100000"/>
+                <a:satMod val="350000"/>
+              </a:schemeClr>
+            </a:gs>
+          </a:gsLst>
+          <a:lin ang="16200000" scaled="0"/>
+        </a:gradFill>
+      </a:fillStyleLst>
+      <a:lnStyleLst>
+        <a:ln w="9525" algn="ctr" cap="flat" cmpd="sng">
+          <a:solidFill>
+            <a:schemeClr val="phClr">
+              <a:shade val="95000"/>
+              <a:satMod val="105000"/>
+            </a:schemeClr>
+          </a:solidFill>
+          <a:prstDash val="solid"/>
+        </a:ln>
+        <a:ln w="25400" algn="ctr" cap="flat" cmpd="sng">
+          <a:solidFill>
+            <a:schemeClr val="phClr"/>
+          </a:solidFill>
+          <a:prstDash val="solid"/>
+        </a:ln>
+        <a:ln w="38100" algn="ctr" cap="flat" cmpd="sng">
+          <a:solidFill>
+            <a:schemeClr val="phClr"/>
+          </a:solidFill>
+          <a:prstDash val="solid"/>
+        </a:ln>
+      </a:lnStyleLst>
+      <a:effectStyleLst>
+        <a:effectStyle>
+          <a:effectLst>
+            <a:outerShdw rotWithShape="0" dir="5400000" blurRad="40000" dist="20000">
+              <a:srgbClr val="000000">
+                <a:alpha val="38000"/>
+              </a:srgbClr>
+            </a:outerShdw>
+          </a:effectLst>
+        </a:effectStyle>
+        <a:effectStyle>
+          <a:effectLst>
+            <a:outerShdw rotWithShape="0" dir="5400000" blurRad="40000" dist="23000">
+              <a:srgbClr val="000000">
+                <a:alpha val="35000"/>
+              </a:srgbClr>
+            </a:outerShdw>
+          </a:effectLst>
+        </a:effectStyle>
+        <a:effectStyle>
+          <a:effectLst>
+            <a:outerShdw rotWithShape="0" dir="5400000" blurRad="40000" dist="23000">
+              <a:srgbClr val="000000">
+                <a:alpha val="35000"/>
+              </a:srgbClr>
+            </a:outerShdw>
+          </a:effectLst>
+          <a:scene3d>
+            <a:camera prst="orthographicFront">
+              <a:rot rev="0" lon="0" lat="0"/>
+            </a:camera>
+            <a:lightRig dir="t" rig="threePt">
+              <a:rot rev="1200000" lon="0" lat="0"/>
+            </a:lightRig>
+          </a:scene3d>
+          <a:sp3d>
+            <a:bevelT w="63500" h="25400"/>
+          </a:sp3d>
+        </a:effectStyle>
+      </a:effectStyleLst>
+      <a:bgFillStyleLst>
+        <a:solidFill>
+          <a:schemeClr val="phClr"/>
+        </a:solidFill>
+        <a:gradFill rotWithShape="1">
+          <a:gsLst>
+            <a:gs pos="0">
+              <a:schemeClr val="phClr">
+                <a:tint val="40000"/>
+                <a:satMod val="350000"/>
+              </a:schemeClr>
+            </a:gs>
+            <a:gs pos="40000">
+              <a:schemeClr val="phClr">
+                <a:tint val="45000"/>
+                <a:shade val="99000"/>
+                <a:satMod val="350000"/>
+              </a:schemeClr>
+            </a:gs>
+            <a:gs pos="100000">
+              <a:schemeClr val="phClr">
+                <a:shade val="20000"/>
+                <a:satMod val="255000"/>
+              </a:schemeClr>
+            </a:gs>
+          </a:gsLst>
+          <a:path path="circle">
+            <a:fillToRect t="-80000" b="180000" r="50000" l="50000"/>
+          </a:path>
+        </a:gradFill>
+        <a:gradFill rotWithShape="1">
+          <a:gsLst>
+            <a:gs pos="0">
+              <a:schemeClr val="phClr">
+                <a:tint val="80000"/>
+                <a:satMod val="300000"/>
+              </a:schemeClr>
+            </a:gs>
+            <a:gs pos="100000">
+              <a:schemeClr val="phClr">
+                <a:shade val="30000"/>
+                <a:satMod val="200000"/>
+              </a:schemeClr>
+            </a:gs>
+          </a:gsLst>
+          <a:path path="circle">
+            <a:fillToRect t="50000" b="50000" r="50000" l="50000"/>
+          </a:path>
+        </a:gradFill>
+      </a:bgFillStyleLst>
+    </a:fmtScheme>
+  </a:themeElements>
+</a:theme>
 </file>
</xml_diff>